<commit_message>
Intermediate commit so that Eli can steal some slides.
git-svn-id: http://dminfo:8686/svn/repository/models/branches/dsm2_distribute_v8_0@1484 cdc4813b-4270-ec4f-936e-925f93a782c2

Former-commit-id: ce55f4cea07b53daf0a498feeb75224bf4d9f34c
</commit_message>
<xml_diff>
--- a/dsm2/presentations/p4_simulation_data.pptx
+++ b/dsm2/presentations/p4_simulation_data.pptx
@@ -5,22 +5,29 @@
     <p:sldMasterId id="2147483648" r:id="rId1"/>
   </p:sldMasterIdLst>
   <p:notesMasterIdLst>
-    <p:notesMasterId r:id="rId12"/>
+    <p:notesMasterId r:id="rId19"/>
   </p:notesMasterIdLst>
   <p:handoutMasterIdLst>
-    <p:handoutMasterId r:id="rId13"/>
+    <p:handoutMasterId r:id="rId20"/>
   </p:handoutMasterIdLst>
   <p:sldIdLst>
     <p:sldId id="429" r:id="rId2"/>
     <p:sldId id="430" r:id="rId3"/>
-    <p:sldId id="448" r:id="rId4"/>
-    <p:sldId id="452" r:id="rId5"/>
-    <p:sldId id="454" r:id="rId6"/>
-    <p:sldId id="455" r:id="rId7"/>
-    <p:sldId id="453" r:id="rId8"/>
-    <p:sldId id="456" r:id="rId9"/>
-    <p:sldId id="457" r:id="rId10"/>
-    <p:sldId id="450" r:id="rId11"/>
+    <p:sldId id="460" r:id="rId4"/>
+    <p:sldId id="463" r:id="rId5"/>
+    <p:sldId id="464" r:id="rId6"/>
+    <p:sldId id="469" r:id="rId7"/>
+    <p:sldId id="465" r:id="rId8"/>
+    <p:sldId id="462" r:id="rId9"/>
+    <p:sldId id="448" r:id="rId10"/>
+    <p:sldId id="452" r:id="rId11"/>
+    <p:sldId id="454" r:id="rId12"/>
+    <p:sldId id="455" r:id="rId13"/>
+    <p:sldId id="458" r:id="rId14"/>
+    <p:sldId id="456" r:id="rId15"/>
+    <p:sldId id="457" r:id="rId16"/>
+    <p:sldId id="453" r:id="rId17"/>
+    <p:sldId id="450" r:id="rId18"/>
   </p:sldIdLst>
   <p:sldSz cx="9144000" cy="6858000" type="screen4x3"/>
   <p:notesSz cx="7010400" cy="9296400"/>
@@ -953,6 +960,802 @@
               <a:rPr lang="en-US" baseline="0" smtClean="0"/>
               <a:t>I/O files.</a:t>
             </a:r>
+            <a:endParaRPr lang="en-US"/>
+          </a:p>
+        </p:txBody>
+      </p:sp>
+    </p:spTree>
+  </p:cSld>
+  <p:clrMapOvr>
+    <a:masterClrMapping/>
+  </p:clrMapOvr>
+</p:notes>
+</file>
+
+<file path=ppt/notesSlides/notesSlide2.xml><?xml version="1.0" encoding="utf-8"?>
+<p:notes xmlns:a="http://schemas.openxmlformats.org/drawingml/2006/main" xmlns:r="http://schemas.openxmlformats.org/officeDocument/2006/relationships" xmlns:p="http://schemas.openxmlformats.org/presentationml/2006/main">
+  <p:cSld>
+    <p:spTree>
+      <p:nvGrpSpPr>
+        <p:cNvPr id="1" name=""/>
+        <p:cNvGrpSpPr/>
+        <p:nvPr/>
+      </p:nvGrpSpPr>
+      <p:grpSpPr>
+        <a:xfrm>
+          <a:off x="0" y="0"/>
+          <a:ext cx="0" cy="0"/>
+          <a:chOff x="0" y="0"/>
+          <a:chExt cx="0" cy="0"/>
+        </a:xfrm>
+      </p:grpSpPr>
+      <p:sp>
+        <p:nvSpPr>
+          <p:cNvPr id="2" name="Slide Image Placeholder 1"/>
+          <p:cNvSpPr>
+            <a:spLocks noGrp="1" noRot="1" noChangeAspect="1"/>
+          </p:cNvSpPr>
+          <p:nvPr>
+            <p:ph type="sldImg"/>
+          </p:nvPr>
+        </p:nvSpPr>
+        <p:spPr/>
+      </p:sp>
+      <p:sp>
+        <p:nvSpPr>
+          <p:cNvPr id="3" name="Notes Placeholder 2"/>
+          <p:cNvSpPr>
+            <a:spLocks noGrp="1"/>
+          </p:cNvSpPr>
+          <p:nvPr>
+            <p:ph type="body" idx="1"/>
+          </p:nvPr>
+        </p:nvSpPr>
+        <p:spPr/>
+        <p:txBody>
+          <a:bodyPr>
+            <a:normAutofit/>
+          </a:bodyPr>
+          <a:lstStyle/>
+          <a:p>
+            <a:r>
+              <a:rPr lang="en-US" dirty="0" smtClean="0"/>
+              <a:t>To model a </a:t>
+            </a:r>
+            <a:endParaRPr lang="en-US" dirty="0"/>
+          </a:p>
+        </p:txBody>
+      </p:sp>
+      <p:sp>
+        <p:nvSpPr>
+          <p:cNvPr id="4" name="Header Placeholder 3"/>
+          <p:cNvSpPr>
+            <a:spLocks noGrp="1"/>
+          </p:cNvSpPr>
+          <p:nvPr>
+            <p:ph type="hdr" sz="quarter" idx="10"/>
+          </p:nvPr>
+        </p:nvSpPr>
+        <p:spPr/>
+        <p:txBody>
+          <a:bodyPr/>
+          <a:lstStyle/>
+          <a:p>
+            <a:r>
+              <a:rPr lang="en-US" smtClean="0"/>
+              <a:t>DSM2 Users Group: "EXAMPLE: Filling in Martinez Stage"</a:t>
+            </a:r>
+            <a:endParaRPr lang="en-US"/>
+          </a:p>
+        </p:txBody>
+      </p:sp>
+      <p:sp>
+        <p:nvSpPr>
+          <p:cNvPr id="5" name="Date Placeholder 4"/>
+          <p:cNvSpPr>
+            <a:spLocks noGrp="1"/>
+          </p:cNvSpPr>
+          <p:nvPr>
+            <p:ph type="dt" idx="11"/>
+          </p:nvPr>
+        </p:nvSpPr>
+        <p:spPr/>
+        <p:txBody>
+          <a:bodyPr/>
+          <a:lstStyle/>
+          <a:p>
+            <a:r>
+              <a:rPr lang="en-US" smtClean="0"/>
+              <a:t>2004.04.27</a:t>
+            </a:r>
+            <a:endParaRPr lang="en-US"/>
+          </a:p>
+        </p:txBody>
+      </p:sp>
+      <p:sp>
+        <p:nvSpPr>
+          <p:cNvPr id="6" name="Slide Number Placeholder 5"/>
+          <p:cNvSpPr>
+            <a:spLocks noGrp="1"/>
+          </p:cNvSpPr>
+          <p:nvPr>
+            <p:ph type="sldNum" sz="quarter" idx="12"/>
+          </p:nvPr>
+        </p:nvSpPr>
+        <p:spPr/>
+        <p:txBody>
+          <a:bodyPr/>
+          <a:lstStyle/>
+          <a:p>
+            <a:fld id="{8D3EB24B-42D1-409E-999A-7EC16A8B48A4}" type="slidenum">
+              <a:rPr lang="en-US" smtClean="0"/>
+              <a:pPr/>
+              <a:t>3</a:t>
+            </a:fld>
+            <a:endParaRPr lang="en-US"/>
+          </a:p>
+        </p:txBody>
+      </p:sp>
+    </p:spTree>
+  </p:cSld>
+  <p:clrMapOvr>
+    <a:masterClrMapping/>
+  </p:clrMapOvr>
+</p:notes>
+</file>
+
+<file path=ppt/notesSlides/notesSlide3.xml><?xml version="1.0" encoding="utf-8"?>
+<p:notes xmlns:a="http://schemas.openxmlformats.org/drawingml/2006/main" xmlns:r="http://schemas.openxmlformats.org/officeDocument/2006/relationships" xmlns:p="http://schemas.openxmlformats.org/presentationml/2006/main">
+  <p:cSld>
+    <p:spTree>
+      <p:nvGrpSpPr>
+        <p:cNvPr id="1" name=""/>
+        <p:cNvGrpSpPr/>
+        <p:nvPr/>
+      </p:nvGrpSpPr>
+      <p:grpSpPr>
+        <a:xfrm>
+          <a:off x="0" y="0"/>
+          <a:ext cx="0" cy="0"/>
+          <a:chOff x="0" y="0"/>
+          <a:chExt cx="0" cy="0"/>
+        </a:xfrm>
+      </p:grpSpPr>
+      <p:sp>
+        <p:nvSpPr>
+          <p:cNvPr id="2" name="Slide Image Placeholder 1"/>
+          <p:cNvSpPr>
+            <a:spLocks noGrp="1" noRot="1" noChangeAspect="1"/>
+          </p:cNvSpPr>
+          <p:nvPr>
+            <p:ph type="sldImg"/>
+          </p:nvPr>
+        </p:nvSpPr>
+        <p:spPr/>
+      </p:sp>
+      <p:sp>
+        <p:nvSpPr>
+          <p:cNvPr id="3" name="Notes Placeholder 2"/>
+          <p:cNvSpPr>
+            <a:spLocks noGrp="1"/>
+          </p:cNvSpPr>
+          <p:nvPr>
+            <p:ph type="body" idx="1"/>
+          </p:nvPr>
+        </p:nvSpPr>
+        <p:spPr/>
+        <p:txBody>
+          <a:bodyPr>
+            <a:normAutofit/>
+          </a:bodyPr>
+          <a:lstStyle/>
+          <a:p>
+            <a:r>
+              <a:rPr lang="en-US" dirty="0" smtClean="0"/>
+              <a:t>To model a </a:t>
+            </a:r>
+            <a:endParaRPr lang="en-US" dirty="0"/>
+          </a:p>
+        </p:txBody>
+      </p:sp>
+      <p:sp>
+        <p:nvSpPr>
+          <p:cNvPr id="4" name="Header Placeholder 3"/>
+          <p:cNvSpPr>
+            <a:spLocks noGrp="1"/>
+          </p:cNvSpPr>
+          <p:nvPr>
+            <p:ph type="hdr" sz="quarter" idx="10"/>
+          </p:nvPr>
+        </p:nvSpPr>
+        <p:spPr/>
+        <p:txBody>
+          <a:bodyPr/>
+          <a:lstStyle/>
+          <a:p>
+            <a:r>
+              <a:rPr lang="en-US" smtClean="0"/>
+              <a:t>DSM2 Users Group: "EXAMPLE: Filling in Martinez Stage"</a:t>
+            </a:r>
+            <a:endParaRPr lang="en-US"/>
+          </a:p>
+        </p:txBody>
+      </p:sp>
+      <p:sp>
+        <p:nvSpPr>
+          <p:cNvPr id="5" name="Date Placeholder 4"/>
+          <p:cNvSpPr>
+            <a:spLocks noGrp="1"/>
+          </p:cNvSpPr>
+          <p:nvPr>
+            <p:ph type="dt" idx="11"/>
+          </p:nvPr>
+        </p:nvSpPr>
+        <p:spPr/>
+        <p:txBody>
+          <a:bodyPr/>
+          <a:lstStyle/>
+          <a:p>
+            <a:r>
+              <a:rPr lang="en-US" smtClean="0"/>
+              <a:t>2004.04.27</a:t>
+            </a:r>
+            <a:endParaRPr lang="en-US"/>
+          </a:p>
+        </p:txBody>
+      </p:sp>
+      <p:sp>
+        <p:nvSpPr>
+          <p:cNvPr id="6" name="Slide Number Placeholder 5"/>
+          <p:cNvSpPr>
+            <a:spLocks noGrp="1"/>
+          </p:cNvSpPr>
+          <p:nvPr>
+            <p:ph type="sldNum" sz="quarter" idx="12"/>
+          </p:nvPr>
+        </p:nvSpPr>
+        <p:spPr/>
+        <p:txBody>
+          <a:bodyPr/>
+          <a:lstStyle/>
+          <a:p>
+            <a:fld id="{8D3EB24B-42D1-409E-999A-7EC16A8B48A4}" type="slidenum">
+              <a:rPr lang="en-US" smtClean="0"/>
+              <a:pPr/>
+              <a:t>4</a:t>
+            </a:fld>
+            <a:endParaRPr lang="en-US"/>
+          </a:p>
+        </p:txBody>
+      </p:sp>
+    </p:spTree>
+  </p:cSld>
+  <p:clrMapOvr>
+    <a:masterClrMapping/>
+  </p:clrMapOvr>
+</p:notes>
+</file>
+
+<file path=ppt/notesSlides/notesSlide4.xml><?xml version="1.0" encoding="utf-8"?>
+<p:notes xmlns:a="http://schemas.openxmlformats.org/drawingml/2006/main" xmlns:r="http://schemas.openxmlformats.org/officeDocument/2006/relationships" xmlns:p="http://schemas.openxmlformats.org/presentationml/2006/main">
+  <p:cSld>
+    <p:spTree>
+      <p:nvGrpSpPr>
+        <p:cNvPr id="1" name=""/>
+        <p:cNvGrpSpPr/>
+        <p:nvPr/>
+      </p:nvGrpSpPr>
+      <p:grpSpPr>
+        <a:xfrm>
+          <a:off x="0" y="0"/>
+          <a:ext cx="0" cy="0"/>
+          <a:chOff x="0" y="0"/>
+          <a:chExt cx="0" cy="0"/>
+        </a:xfrm>
+      </p:grpSpPr>
+      <p:sp>
+        <p:nvSpPr>
+          <p:cNvPr id="2" name="Slide Image Placeholder 1"/>
+          <p:cNvSpPr>
+            <a:spLocks noGrp="1" noRot="1" noChangeAspect="1"/>
+          </p:cNvSpPr>
+          <p:nvPr>
+            <p:ph type="sldImg"/>
+          </p:nvPr>
+        </p:nvSpPr>
+        <p:spPr/>
+      </p:sp>
+      <p:sp>
+        <p:nvSpPr>
+          <p:cNvPr id="3" name="Notes Placeholder 2"/>
+          <p:cNvSpPr>
+            <a:spLocks noGrp="1"/>
+          </p:cNvSpPr>
+          <p:nvPr>
+            <p:ph type="body" idx="1"/>
+          </p:nvPr>
+        </p:nvSpPr>
+        <p:spPr/>
+        <p:txBody>
+          <a:bodyPr>
+            <a:normAutofit/>
+          </a:bodyPr>
+          <a:lstStyle/>
+          <a:p>
+            <a:r>
+              <a:rPr lang="en-US" dirty="0" smtClean="0"/>
+              <a:t>To model a </a:t>
+            </a:r>
+            <a:endParaRPr lang="en-US" dirty="0"/>
+          </a:p>
+        </p:txBody>
+      </p:sp>
+      <p:sp>
+        <p:nvSpPr>
+          <p:cNvPr id="4" name="Header Placeholder 3"/>
+          <p:cNvSpPr>
+            <a:spLocks noGrp="1"/>
+          </p:cNvSpPr>
+          <p:nvPr>
+            <p:ph type="hdr" sz="quarter" idx="10"/>
+          </p:nvPr>
+        </p:nvSpPr>
+        <p:spPr/>
+        <p:txBody>
+          <a:bodyPr/>
+          <a:lstStyle/>
+          <a:p>
+            <a:r>
+              <a:rPr lang="en-US" smtClean="0"/>
+              <a:t>DSM2 Users Group: "EXAMPLE: Filling in Martinez Stage"</a:t>
+            </a:r>
+            <a:endParaRPr lang="en-US"/>
+          </a:p>
+        </p:txBody>
+      </p:sp>
+      <p:sp>
+        <p:nvSpPr>
+          <p:cNvPr id="5" name="Date Placeholder 4"/>
+          <p:cNvSpPr>
+            <a:spLocks noGrp="1"/>
+          </p:cNvSpPr>
+          <p:nvPr>
+            <p:ph type="dt" idx="11"/>
+          </p:nvPr>
+        </p:nvSpPr>
+        <p:spPr/>
+        <p:txBody>
+          <a:bodyPr/>
+          <a:lstStyle/>
+          <a:p>
+            <a:r>
+              <a:rPr lang="en-US" smtClean="0"/>
+              <a:t>2004.04.27</a:t>
+            </a:r>
+            <a:endParaRPr lang="en-US"/>
+          </a:p>
+        </p:txBody>
+      </p:sp>
+      <p:sp>
+        <p:nvSpPr>
+          <p:cNvPr id="6" name="Slide Number Placeholder 5"/>
+          <p:cNvSpPr>
+            <a:spLocks noGrp="1"/>
+          </p:cNvSpPr>
+          <p:nvPr>
+            <p:ph type="sldNum" sz="quarter" idx="12"/>
+          </p:nvPr>
+        </p:nvSpPr>
+        <p:spPr/>
+        <p:txBody>
+          <a:bodyPr/>
+          <a:lstStyle/>
+          <a:p>
+            <a:fld id="{8D3EB24B-42D1-409E-999A-7EC16A8B48A4}" type="slidenum">
+              <a:rPr lang="en-US" smtClean="0"/>
+              <a:pPr/>
+              <a:t>5</a:t>
+            </a:fld>
+            <a:endParaRPr lang="en-US"/>
+          </a:p>
+        </p:txBody>
+      </p:sp>
+    </p:spTree>
+  </p:cSld>
+  <p:clrMapOvr>
+    <a:masterClrMapping/>
+  </p:clrMapOvr>
+</p:notes>
+</file>
+
+<file path=ppt/notesSlides/notesSlide5.xml><?xml version="1.0" encoding="utf-8"?>
+<p:notes xmlns:a="http://schemas.openxmlformats.org/drawingml/2006/main" xmlns:r="http://schemas.openxmlformats.org/officeDocument/2006/relationships" xmlns:p="http://schemas.openxmlformats.org/presentationml/2006/main">
+  <p:cSld>
+    <p:spTree>
+      <p:nvGrpSpPr>
+        <p:cNvPr id="1" name=""/>
+        <p:cNvGrpSpPr/>
+        <p:nvPr/>
+      </p:nvGrpSpPr>
+      <p:grpSpPr>
+        <a:xfrm>
+          <a:off x="0" y="0"/>
+          <a:ext cx="0" cy="0"/>
+          <a:chOff x="0" y="0"/>
+          <a:chExt cx="0" cy="0"/>
+        </a:xfrm>
+      </p:grpSpPr>
+      <p:sp>
+        <p:nvSpPr>
+          <p:cNvPr id="2" name="Slide Image Placeholder 1"/>
+          <p:cNvSpPr>
+            <a:spLocks noGrp="1" noRot="1" noChangeAspect="1"/>
+          </p:cNvSpPr>
+          <p:nvPr>
+            <p:ph type="sldImg"/>
+          </p:nvPr>
+        </p:nvSpPr>
+        <p:spPr/>
+      </p:sp>
+      <p:sp>
+        <p:nvSpPr>
+          <p:cNvPr id="3" name="Notes Placeholder 2"/>
+          <p:cNvSpPr>
+            <a:spLocks noGrp="1"/>
+          </p:cNvSpPr>
+          <p:nvPr>
+            <p:ph type="body" idx="1"/>
+          </p:nvPr>
+        </p:nvSpPr>
+        <p:spPr/>
+        <p:txBody>
+          <a:bodyPr>
+            <a:normAutofit/>
+          </a:bodyPr>
+          <a:lstStyle/>
+          <a:p>
+            <a:r>
+              <a:rPr lang="en-US" dirty="0" smtClean="0"/>
+              <a:t>To model a </a:t>
+            </a:r>
+            <a:endParaRPr lang="en-US" dirty="0"/>
+          </a:p>
+        </p:txBody>
+      </p:sp>
+      <p:sp>
+        <p:nvSpPr>
+          <p:cNvPr id="4" name="Header Placeholder 3"/>
+          <p:cNvSpPr>
+            <a:spLocks noGrp="1"/>
+          </p:cNvSpPr>
+          <p:nvPr>
+            <p:ph type="hdr" sz="quarter" idx="10"/>
+          </p:nvPr>
+        </p:nvSpPr>
+        <p:spPr/>
+        <p:txBody>
+          <a:bodyPr/>
+          <a:lstStyle/>
+          <a:p>
+            <a:r>
+              <a:rPr lang="en-US" smtClean="0"/>
+              <a:t>DSM2 Users Group: "EXAMPLE: Filling in Martinez Stage"</a:t>
+            </a:r>
+            <a:endParaRPr lang="en-US"/>
+          </a:p>
+        </p:txBody>
+      </p:sp>
+      <p:sp>
+        <p:nvSpPr>
+          <p:cNvPr id="5" name="Date Placeholder 4"/>
+          <p:cNvSpPr>
+            <a:spLocks noGrp="1"/>
+          </p:cNvSpPr>
+          <p:nvPr>
+            <p:ph type="dt" idx="11"/>
+          </p:nvPr>
+        </p:nvSpPr>
+        <p:spPr/>
+        <p:txBody>
+          <a:bodyPr/>
+          <a:lstStyle/>
+          <a:p>
+            <a:r>
+              <a:rPr lang="en-US" smtClean="0"/>
+              <a:t>2004.04.27</a:t>
+            </a:r>
+            <a:endParaRPr lang="en-US"/>
+          </a:p>
+        </p:txBody>
+      </p:sp>
+      <p:sp>
+        <p:nvSpPr>
+          <p:cNvPr id="6" name="Slide Number Placeholder 5"/>
+          <p:cNvSpPr>
+            <a:spLocks noGrp="1"/>
+          </p:cNvSpPr>
+          <p:nvPr>
+            <p:ph type="sldNum" sz="quarter" idx="12"/>
+          </p:nvPr>
+        </p:nvSpPr>
+        <p:spPr/>
+        <p:txBody>
+          <a:bodyPr/>
+          <a:lstStyle/>
+          <a:p>
+            <a:fld id="{8D3EB24B-42D1-409E-999A-7EC16A8B48A4}" type="slidenum">
+              <a:rPr lang="en-US" smtClean="0"/>
+              <a:pPr/>
+              <a:t>6</a:t>
+            </a:fld>
+            <a:endParaRPr lang="en-US"/>
+          </a:p>
+        </p:txBody>
+      </p:sp>
+    </p:spTree>
+  </p:cSld>
+  <p:clrMapOvr>
+    <a:masterClrMapping/>
+  </p:clrMapOvr>
+</p:notes>
+</file>
+
+<file path=ppt/notesSlides/notesSlide6.xml><?xml version="1.0" encoding="utf-8"?>
+<p:notes xmlns:a="http://schemas.openxmlformats.org/drawingml/2006/main" xmlns:r="http://schemas.openxmlformats.org/officeDocument/2006/relationships" xmlns:p="http://schemas.openxmlformats.org/presentationml/2006/main">
+  <p:cSld>
+    <p:spTree>
+      <p:nvGrpSpPr>
+        <p:cNvPr id="1" name=""/>
+        <p:cNvGrpSpPr/>
+        <p:nvPr/>
+      </p:nvGrpSpPr>
+      <p:grpSpPr>
+        <a:xfrm>
+          <a:off x="0" y="0"/>
+          <a:ext cx="0" cy="0"/>
+          <a:chOff x="0" y="0"/>
+          <a:chExt cx="0" cy="0"/>
+        </a:xfrm>
+      </p:grpSpPr>
+      <p:sp>
+        <p:nvSpPr>
+          <p:cNvPr id="2" name="Slide Image Placeholder 1"/>
+          <p:cNvSpPr>
+            <a:spLocks noGrp="1" noRot="1" noChangeAspect="1"/>
+          </p:cNvSpPr>
+          <p:nvPr>
+            <p:ph type="sldImg"/>
+          </p:nvPr>
+        </p:nvSpPr>
+        <p:spPr/>
+      </p:sp>
+      <p:sp>
+        <p:nvSpPr>
+          <p:cNvPr id="3" name="Notes Placeholder 2"/>
+          <p:cNvSpPr>
+            <a:spLocks noGrp="1"/>
+          </p:cNvSpPr>
+          <p:nvPr>
+            <p:ph type="body" idx="1"/>
+          </p:nvPr>
+        </p:nvSpPr>
+        <p:spPr/>
+        <p:txBody>
+          <a:bodyPr>
+            <a:normAutofit/>
+          </a:bodyPr>
+          <a:lstStyle/>
+          <a:p>
+            <a:r>
+              <a:rPr lang="en-US" dirty="0" smtClean="0"/>
+              <a:t>To model a </a:t>
+            </a:r>
+            <a:endParaRPr lang="en-US" dirty="0"/>
+          </a:p>
+        </p:txBody>
+      </p:sp>
+      <p:sp>
+        <p:nvSpPr>
+          <p:cNvPr id="4" name="Header Placeholder 3"/>
+          <p:cNvSpPr>
+            <a:spLocks noGrp="1"/>
+          </p:cNvSpPr>
+          <p:nvPr>
+            <p:ph type="hdr" sz="quarter" idx="10"/>
+          </p:nvPr>
+        </p:nvSpPr>
+        <p:spPr/>
+        <p:txBody>
+          <a:bodyPr/>
+          <a:lstStyle/>
+          <a:p>
+            <a:r>
+              <a:rPr lang="en-US" smtClean="0"/>
+              <a:t>DSM2 Users Group: "EXAMPLE: Filling in Martinez Stage"</a:t>
+            </a:r>
+            <a:endParaRPr lang="en-US"/>
+          </a:p>
+        </p:txBody>
+      </p:sp>
+      <p:sp>
+        <p:nvSpPr>
+          <p:cNvPr id="5" name="Date Placeholder 4"/>
+          <p:cNvSpPr>
+            <a:spLocks noGrp="1"/>
+          </p:cNvSpPr>
+          <p:nvPr>
+            <p:ph type="dt" idx="11"/>
+          </p:nvPr>
+        </p:nvSpPr>
+        <p:spPr/>
+        <p:txBody>
+          <a:bodyPr/>
+          <a:lstStyle/>
+          <a:p>
+            <a:r>
+              <a:rPr lang="en-US" smtClean="0"/>
+              <a:t>2004.04.27</a:t>
+            </a:r>
+            <a:endParaRPr lang="en-US"/>
+          </a:p>
+        </p:txBody>
+      </p:sp>
+      <p:sp>
+        <p:nvSpPr>
+          <p:cNvPr id="6" name="Slide Number Placeholder 5"/>
+          <p:cNvSpPr>
+            <a:spLocks noGrp="1"/>
+          </p:cNvSpPr>
+          <p:nvPr>
+            <p:ph type="sldNum" sz="quarter" idx="12"/>
+          </p:nvPr>
+        </p:nvSpPr>
+        <p:spPr/>
+        <p:txBody>
+          <a:bodyPr/>
+          <a:lstStyle/>
+          <a:p>
+            <a:fld id="{8D3EB24B-42D1-409E-999A-7EC16A8B48A4}" type="slidenum">
+              <a:rPr lang="en-US" smtClean="0"/>
+              <a:pPr/>
+              <a:t>7</a:t>
+            </a:fld>
+            <a:endParaRPr lang="en-US"/>
+          </a:p>
+        </p:txBody>
+      </p:sp>
+    </p:spTree>
+  </p:cSld>
+  <p:clrMapOvr>
+    <a:masterClrMapping/>
+  </p:clrMapOvr>
+</p:notes>
+</file>
+
+<file path=ppt/notesSlides/notesSlide7.xml><?xml version="1.0" encoding="utf-8"?>
+<p:notes xmlns:a="http://schemas.openxmlformats.org/drawingml/2006/main" xmlns:r="http://schemas.openxmlformats.org/officeDocument/2006/relationships" xmlns:p="http://schemas.openxmlformats.org/presentationml/2006/main">
+  <p:cSld>
+    <p:spTree>
+      <p:nvGrpSpPr>
+        <p:cNvPr id="1" name=""/>
+        <p:cNvGrpSpPr/>
+        <p:nvPr/>
+      </p:nvGrpSpPr>
+      <p:grpSpPr>
+        <a:xfrm>
+          <a:off x="0" y="0"/>
+          <a:ext cx="0" cy="0"/>
+          <a:chOff x="0" y="0"/>
+          <a:chExt cx="0" cy="0"/>
+        </a:xfrm>
+      </p:grpSpPr>
+      <p:sp>
+        <p:nvSpPr>
+          <p:cNvPr id="2" name="Slide Image Placeholder 1"/>
+          <p:cNvSpPr>
+            <a:spLocks noGrp="1" noRot="1" noChangeAspect="1"/>
+          </p:cNvSpPr>
+          <p:nvPr>
+            <p:ph type="sldImg"/>
+          </p:nvPr>
+        </p:nvSpPr>
+        <p:spPr/>
+      </p:sp>
+      <p:sp>
+        <p:nvSpPr>
+          <p:cNvPr id="3" name="Notes Placeholder 2"/>
+          <p:cNvSpPr>
+            <a:spLocks noGrp="1"/>
+          </p:cNvSpPr>
+          <p:nvPr>
+            <p:ph type="body" idx="1"/>
+          </p:nvPr>
+        </p:nvSpPr>
+        <p:spPr/>
+        <p:txBody>
+          <a:bodyPr>
+            <a:normAutofit/>
+          </a:bodyPr>
+          <a:lstStyle/>
+          <a:p>
+            <a:r>
+              <a:rPr lang="en-US" dirty="0" smtClean="0"/>
+              <a:t>Only inflow matter for QUAL (if</a:t>
+            </a:r>
+            <a:r>
+              <a:rPr lang="en-US" baseline="0" dirty="0" smtClean="0"/>
+              <a:t> tidal like Martinez, assigned time series may be ignored part of the time)</a:t>
+            </a:r>
+            <a:endParaRPr lang="en-US" dirty="0"/>
+          </a:p>
+        </p:txBody>
+      </p:sp>
+      <p:sp>
+        <p:nvSpPr>
+          <p:cNvPr id="4" name="Header Placeholder 3"/>
+          <p:cNvSpPr>
+            <a:spLocks noGrp="1"/>
+          </p:cNvSpPr>
+          <p:nvPr>
+            <p:ph type="hdr" sz="quarter" idx="10"/>
+          </p:nvPr>
+        </p:nvSpPr>
+        <p:spPr/>
+        <p:txBody>
+          <a:bodyPr/>
+          <a:lstStyle/>
+          <a:p>
+            <a:r>
+              <a:rPr lang="en-US" smtClean="0"/>
+              <a:t>DSM2 Users Group: "EXAMPLE: Filling in Martinez Stage"</a:t>
+            </a:r>
+            <a:endParaRPr lang="en-US"/>
+          </a:p>
+        </p:txBody>
+      </p:sp>
+      <p:sp>
+        <p:nvSpPr>
+          <p:cNvPr id="5" name="Date Placeholder 4"/>
+          <p:cNvSpPr>
+            <a:spLocks noGrp="1"/>
+          </p:cNvSpPr>
+          <p:nvPr>
+            <p:ph type="dt" idx="11"/>
+          </p:nvPr>
+        </p:nvSpPr>
+        <p:spPr/>
+        <p:txBody>
+          <a:bodyPr/>
+          <a:lstStyle/>
+          <a:p>
+            <a:r>
+              <a:rPr lang="en-US" smtClean="0"/>
+              <a:t>2004.04.27</a:t>
+            </a:r>
+            <a:endParaRPr lang="en-US"/>
+          </a:p>
+        </p:txBody>
+      </p:sp>
+      <p:sp>
+        <p:nvSpPr>
+          <p:cNvPr id="6" name="Slide Number Placeholder 5"/>
+          <p:cNvSpPr>
+            <a:spLocks noGrp="1"/>
+          </p:cNvSpPr>
+          <p:nvPr>
+            <p:ph type="sldNum" sz="quarter" idx="12"/>
+          </p:nvPr>
+        </p:nvSpPr>
+        <p:spPr/>
+        <p:txBody>
+          <a:bodyPr/>
+          <a:lstStyle/>
+          <a:p>
+            <a:fld id="{8D3EB24B-42D1-409E-999A-7EC16A8B48A4}" type="slidenum">
+              <a:rPr lang="en-US" smtClean="0"/>
+              <a:pPr/>
+              <a:t>9</a:t>
+            </a:fld>
             <a:endParaRPr lang="en-US"/>
           </a:p>
         </p:txBody>
@@ -3682,11 +4485,843 @@
           <a:p>
             <a:r>
               <a:rPr lang="en-US" dirty="0" smtClean="0"/>
-              <a:t>Tutorial </a:t>
-            </a:r>
-            <a:r>
-              <a:rPr lang="en-US" dirty="0" smtClean="0"/>
-              <a:t>4: Time Series</a:t>
+              <a:t>Time Series Control</a:t>
+            </a:r>
+            <a:endParaRPr lang="en-US" dirty="0"/>
+          </a:p>
+        </p:txBody>
+      </p:sp>
+      <p:sp>
+        <p:nvSpPr>
+          <p:cNvPr id="3" name="Content Placeholder 2"/>
+          <p:cNvSpPr>
+            <a:spLocks noGrp="1"/>
+          </p:cNvSpPr>
+          <p:nvPr>
+            <p:ph idx="1"/>
+          </p:nvPr>
+        </p:nvSpPr>
+        <p:spPr>
+          <a:xfrm>
+            <a:off x="348712" y="1593742"/>
+            <a:ext cx="8132736" cy="4512589"/>
+          </a:xfrm>
+        </p:spPr>
+        <p:txBody>
+          <a:bodyPr/>
+          <a:lstStyle/>
+          <a:p>
+            <a:r>
+              <a:rPr lang="en-US" dirty="0" smtClean="0"/>
+              <a:t>Default value -&gt; time series -&gt; </a:t>
+            </a:r>
+            <a:r>
+              <a:rPr lang="en-US" dirty="0" err="1" smtClean="0"/>
+              <a:t>oprule</a:t>
+            </a:r>
+            <a:endParaRPr lang="en-US" dirty="0" smtClean="0"/>
+          </a:p>
+          <a:p>
+            <a:r>
+              <a:rPr lang="en-US" dirty="0" smtClean="0"/>
+              <a:t>Graphic with example (probably gate op)</a:t>
+            </a:r>
+          </a:p>
+        </p:txBody>
+      </p:sp>
+      <p:sp>
+        <p:nvSpPr>
+          <p:cNvPr id="4" name="Date Placeholder 3"/>
+          <p:cNvSpPr>
+            <a:spLocks noGrp="1"/>
+          </p:cNvSpPr>
+          <p:nvPr>
+            <p:ph type="dt" sz="half" idx="10"/>
+          </p:nvPr>
+        </p:nvSpPr>
+        <p:spPr/>
+        <p:txBody>
+          <a:bodyPr/>
+          <a:lstStyle/>
+          <a:p>
+            <a:fld id="{AB98F214-5D90-468C-9EE8-E1612B8D2BE2}" type="slidenum">
+              <a:rPr lang="en-US" smtClean="0"/>
+              <a:pPr/>
+              <a:t>10</a:t>
+            </a:fld>
+            <a:endParaRPr lang="en-US"/>
+          </a:p>
+        </p:txBody>
+      </p:sp>
+    </p:spTree>
+  </p:cSld>
+  <p:clrMapOvr>
+    <a:masterClrMapping/>
+  </p:clrMapOvr>
+  <p:transition/>
+  <p:timing>
+    <p:tnLst>
+      <p:par>
+        <p:cTn id="1" dur="indefinite" restart="never" nodeType="tmRoot"/>
+      </p:par>
+    </p:tnLst>
+  </p:timing>
+</p:sld>
+</file>
+
+<file path=ppt/slides/slide11.xml><?xml version="1.0" encoding="utf-8"?>
+<p:sld xmlns:a="http://schemas.openxmlformats.org/drawingml/2006/main" xmlns:r="http://schemas.openxmlformats.org/officeDocument/2006/relationships" xmlns:p="http://schemas.openxmlformats.org/presentationml/2006/main">
+  <p:cSld>
+    <p:spTree>
+      <p:nvGrpSpPr>
+        <p:cNvPr id="1" name=""/>
+        <p:cNvGrpSpPr/>
+        <p:nvPr/>
+      </p:nvGrpSpPr>
+      <p:grpSpPr>
+        <a:xfrm>
+          <a:off x="0" y="0"/>
+          <a:ext cx="0" cy="0"/>
+          <a:chOff x="0" y="0"/>
+          <a:chExt cx="0" cy="0"/>
+        </a:xfrm>
+      </p:grpSpPr>
+      <p:sp>
+        <p:nvSpPr>
+          <p:cNvPr id="2" name="Title 1"/>
+          <p:cNvSpPr>
+            <a:spLocks noGrp="1"/>
+          </p:cNvSpPr>
+          <p:nvPr>
+            <p:ph type="title"/>
+          </p:nvPr>
+        </p:nvSpPr>
+        <p:spPr/>
+        <p:txBody>
+          <a:bodyPr/>
+          <a:lstStyle/>
+          <a:p>
+            <a:r>
+              <a:rPr lang="en-US" dirty="0" smtClean="0"/>
+              <a:t>Initial Condition Input</a:t>
+            </a:r>
+            <a:endParaRPr lang="en-US" dirty="0"/>
+          </a:p>
+        </p:txBody>
+      </p:sp>
+      <p:sp>
+        <p:nvSpPr>
+          <p:cNvPr id="3" name="Content Placeholder 2"/>
+          <p:cNvSpPr>
+            <a:spLocks noGrp="1"/>
+          </p:cNvSpPr>
+          <p:nvPr>
+            <p:ph idx="1"/>
+          </p:nvPr>
+        </p:nvSpPr>
+        <p:spPr/>
+        <p:txBody>
+          <a:bodyPr/>
+          <a:lstStyle/>
+          <a:p>
+            <a:r>
+              <a:rPr lang="en-US" dirty="0" smtClean="0"/>
+              <a:t>HYDRO Default: </a:t>
+            </a:r>
+          </a:p>
+          <a:p>
+            <a:pPr lvl="1"/>
+            <a:r>
+              <a:rPr lang="en-US" dirty="0" smtClean="0"/>
+              <a:t>CHANNEL_IC</a:t>
+            </a:r>
+          </a:p>
+          <a:p>
+            <a:pPr lvl="1"/>
+            <a:r>
+              <a:rPr lang="en-US" dirty="0" smtClean="0"/>
+              <a:t>RESERVOIR_IC</a:t>
+            </a:r>
+          </a:p>
+          <a:p>
+            <a:r>
+              <a:rPr lang="en-US" dirty="0" smtClean="0"/>
+              <a:t>QUAL Default</a:t>
+            </a:r>
+          </a:p>
+          <a:p>
+            <a:pPr lvl="1"/>
+            <a:r>
+              <a:rPr lang="en-US" dirty="0" smtClean="0"/>
+              <a:t>Scalar </a:t>
+            </a:r>
+            <a:r>
+              <a:rPr lang="en-US" dirty="0" err="1" smtClean="0"/>
+              <a:t>init_conc</a:t>
+            </a:r>
+            <a:endParaRPr lang="en-US" dirty="0" smtClean="0"/>
+          </a:p>
+          <a:p>
+            <a:pPr lvl="1"/>
+            <a:r>
+              <a:rPr lang="en-US" dirty="0" smtClean="0"/>
+              <a:t>Hard to find single number for DO constituents</a:t>
+            </a:r>
+          </a:p>
+          <a:p>
+            <a:r>
+              <a:rPr lang="en-US" dirty="0" smtClean="0"/>
+              <a:t>Restart files replace the default</a:t>
+            </a:r>
+          </a:p>
+        </p:txBody>
+      </p:sp>
+      <p:sp>
+        <p:nvSpPr>
+          <p:cNvPr id="4" name="Date Placeholder 3"/>
+          <p:cNvSpPr>
+            <a:spLocks noGrp="1"/>
+          </p:cNvSpPr>
+          <p:nvPr>
+            <p:ph type="dt" sz="half" idx="10"/>
+          </p:nvPr>
+        </p:nvSpPr>
+        <p:spPr/>
+        <p:txBody>
+          <a:bodyPr/>
+          <a:lstStyle/>
+          <a:p>
+            <a:fld id="{AB98F214-5D90-468C-9EE8-E1612B8D2BE2}" type="slidenum">
+              <a:rPr lang="en-US" smtClean="0"/>
+              <a:pPr/>
+              <a:t>11</a:t>
+            </a:fld>
+            <a:endParaRPr lang="en-US"/>
+          </a:p>
+        </p:txBody>
+      </p:sp>
+    </p:spTree>
+  </p:cSld>
+  <p:clrMapOvr>
+    <a:masterClrMapping/>
+  </p:clrMapOvr>
+  <p:transition/>
+</p:sld>
+</file>
+
+<file path=ppt/slides/slide12.xml><?xml version="1.0" encoding="utf-8"?>
+<p:sld xmlns:a="http://schemas.openxmlformats.org/drawingml/2006/main" xmlns:r="http://schemas.openxmlformats.org/officeDocument/2006/relationships" xmlns:p="http://schemas.openxmlformats.org/presentationml/2006/main">
+  <p:cSld>
+    <p:spTree>
+      <p:nvGrpSpPr>
+        <p:cNvPr id="1" name=""/>
+        <p:cNvGrpSpPr/>
+        <p:nvPr/>
+      </p:nvGrpSpPr>
+      <p:grpSpPr>
+        <a:xfrm>
+          <a:off x="0" y="0"/>
+          <a:ext cx="0" cy="0"/>
+          <a:chOff x="0" y="0"/>
+          <a:chExt cx="0" cy="0"/>
+        </a:xfrm>
+      </p:grpSpPr>
+      <p:sp>
+        <p:nvSpPr>
+          <p:cNvPr id="2" name="Title 1"/>
+          <p:cNvSpPr>
+            <a:spLocks noGrp="1"/>
+          </p:cNvSpPr>
+          <p:nvPr>
+            <p:ph type="title"/>
+          </p:nvPr>
+        </p:nvSpPr>
+        <p:spPr/>
+        <p:txBody>
+          <a:bodyPr/>
+          <a:lstStyle/>
+          <a:p>
+            <a:r>
+              <a:rPr lang="en-US" dirty="0" smtClean="0"/>
+              <a:t>Initial Conditions	</a:t>
+            </a:r>
+            <a:endParaRPr lang="en-US" dirty="0"/>
+          </a:p>
+        </p:txBody>
+      </p:sp>
+      <p:sp>
+        <p:nvSpPr>
+          <p:cNvPr id="3" name="Content Placeholder 2"/>
+          <p:cNvSpPr>
+            <a:spLocks noGrp="1"/>
+          </p:cNvSpPr>
+          <p:nvPr>
+            <p:ph idx="1"/>
+          </p:nvPr>
+        </p:nvSpPr>
+        <p:spPr/>
+        <p:txBody>
+          <a:bodyPr/>
+          <a:lstStyle/>
+          <a:p>
+            <a:r>
+              <a:rPr lang="en-US" dirty="0" smtClean="0"/>
+              <a:t>HYDRO and QUAL require initial…</a:t>
+            </a:r>
+          </a:p>
+          <a:p>
+            <a:r>
+              <a:rPr lang="en-US" dirty="0" smtClean="0"/>
+              <a:t>System Memory of hydro </a:t>
+            </a:r>
+            <a:r>
+              <a:rPr lang="en-US" dirty="0" err="1" smtClean="0"/>
+              <a:t>vs</a:t>
+            </a:r>
+            <a:r>
+              <a:rPr lang="en-US" dirty="0" smtClean="0"/>
+              <a:t> </a:t>
+            </a:r>
+            <a:r>
+              <a:rPr lang="en-US" dirty="0" err="1" smtClean="0"/>
+              <a:t>qual</a:t>
+            </a:r>
+            <a:endParaRPr lang="en-US" dirty="0" smtClean="0"/>
+          </a:p>
+          <a:p>
+            <a:r>
+              <a:rPr lang="en-US" dirty="0" smtClean="0"/>
+              <a:t>Practices (cold start, warm)</a:t>
+            </a:r>
+          </a:p>
+          <a:p>
+            <a:endParaRPr lang="en-US" dirty="0" smtClean="0"/>
+          </a:p>
+          <a:p>
+            <a:pPr algn="ctr"/>
+            <a:endParaRPr lang="en-US" dirty="0"/>
+          </a:p>
+        </p:txBody>
+      </p:sp>
+      <p:sp>
+        <p:nvSpPr>
+          <p:cNvPr id="4" name="Date Placeholder 3"/>
+          <p:cNvSpPr>
+            <a:spLocks noGrp="1"/>
+          </p:cNvSpPr>
+          <p:nvPr>
+            <p:ph type="dt" sz="half" idx="10"/>
+          </p:nvPr>
+        </p:nvSpPr>
+        <p:spPr/>
+        <p:txBody>
+          <a:bodyPr/>
+          <a:lstStyle/>
+          <a:p>
+            <a:fld id="{AB98F214-5D90-468C-9EE8-E1612B8D2BE2}" type="slidenum">
+              <a:rPr lang="en-US" smtClean="0"/>
+              <a:pPr/>
+              <a:t>12</a:t>
+            </a:fld>
+            <a:endParaRPr lang="en-US"/>
+          </a:p>
+        </p:txBody>
+      </p:sp>
+    </p:spTree>
+  </p:cSld>
+  <p:clrMapOvr>
+    <a:masterClrMapping/>
+  </p:clrMapOvr>
+  <p:transition/>
+</p:sld>
+</file>
+
+<file path=ppt/slides/slide13.xml><?xml version="1.0" encoding="utf-8"?>
+<p:sld xmlns:a="http://schemas.openxmlformats.org/drawingml/2006/main" xmlns:r="http://schemas.openxmlformats.org/officeDocument/2006/relationships" xmlns:p="http://schemas.openxmlformats.org/presentationml/2006/main">
+  <p:cSld>
+    <p:spTree>
+      <p:nvGrpSpPr>
+        <p:cNvPr id="1" name=""/>
+        <p:cNvGrpSpPr/>
+        <p:nvPr/>
+      </p:nvGrpSpPr>
+      <p:grpSpPr>
+        <a:xfrm>
+          <a:off x="0" y="0"/>
+          <a:ext cx="0" cy="0"/>
+          <a:chOff x="0" y="0"/>
+          <a:chExt cx="0" cy="0"/>
+        </a:xfrm>
+      </p:grpSpPr>
+      <p:sp>
+        <p:nvSpPr>
+          <p:cNvPr id="2" name="Title 1"/>
+          <p:cNvSpPr>
+            <a:spLocks noGrp="1"/>
+          </p:cNvSpPr>
+          <p:nvPr>
+            <p:ph type="title"/>
+          </p:nvPr>
+        </p:nvSpPr>
+        <p:spPr/>
+        <p:txBody>
+          <a:bodyPr/>
+          <a:lstStyle/>
+          <a:p>
+            <a:r>
+              <a:rPr lang="en-US" dirty="0" smtClean="0"/>
+              <a:t>Time Series Output</a:t>
+            </a:r>
+            <a:endParaRPr lang="en-US" dirty="0"/>
+          </a:p>
+        </p:txBody>
+      </p:sp>
+      <p:sp>
+        <p:nvSpPr>
+          <p:cNvPr id="3" name="Content Placeholder 2"/>
+          <p:cNvSpPr>
+            <a:spLocks noGrp="1"/>
+          </p:cNvSpPr>
+          <p:nvPr>
+            <p:ph idx="1"/>
+          </p:nvPr>
+        </p:nvSpPr>
+        <p:spPr/>
+        <p:txBody>
+          <a:bodyPr/>
+          <a:lstStyle/>
+          <a:p>
+            <a:r>
+              <a:rPr lang="en-US" dirty="0" smtClean="0"/>
+              <a:t>What can we output?</a:t>
+            </a:r>
+          </a:p>
+          <a:p>
+            <a:r>
+              <a:rPr lang="en-US" dirty="0" smtClean="0"/>
+              <a:t>How? Formats text and DSS</a:t>
+            </a:r>
+            <a:endParaRPr lang="en-US" dirty="0"/>
+          </a:p>
+        </p:txBody>
+      </p:sp>
+      <p:sp>
+        <p:nvSpPr>
+          <p:cNvPr id="4" name="Date Placeholder 3"/>
+          <p:cNvSpPr>
+            <a:spLocks noGrp="1"/>
+          </p:cNvSpPr>
+          <p:nvPr>
+            <p:ph type="dt" sz="half" idx="10"/>
+          </p:nvPr>
+        </p:nvSpPr>
+        <p:spPr/>
+        <p:txBody>
+          <a:bodyPr/>
+          <a:lstStyle/>
+          <a:p>
+            <a:fld id="{AB98F214-5D90-468C-9EE8-E1612B8D2BE2}" type="slidenum">
+              <a:rPr lang="en-US" smtClean="0"/>
+              <a:pPr/>
+              <a:t>13</a:t>
+            </a:fld>
+            <a:endParaRPr lang="en-US"/>
+          </a:p>
+        </p:txBody>
+      </p:sp>
+    </p:spTree>
+  </p:cSld>
+  <p:clrMapOvr>
+    <a:masterClrMapping/>
+  </p:clrMapOvr>
+  <p:transition/>
+</p:sld>
+</file>
+
+<file path=ppt/slides/slide14.xml><?xml version="1.0" encoding="utf-8"?>
+<p:sld xmlns:a="http://schemas.openxmlformats.org/drawingml/2006/main" xmlns:r="http://schemas.openxmlformats.org/officeDocument/2006/relationships" xmlns:p="http://schemas.openxmlformats.org/presentationml/2006/main">
+  <p:cSld>
+    <p:spTree>
+      <p:nvGrpSpPr>
+        <p:cNvPr id="1" name=""/>
+        <p:cNvGrpSpPr/>
+        <p:nvPr/>
+      </p:nvGrpSpPr>
+      <p:grpSpPr>
+        <a:xfrm>
+          <a:off x="0" y="0"/>
+          <a:ext cx="0" cy="0"/>
+          <a:chOff x="0" y="0"/>
+          <a:chExt cx="0" cy="0"/>
+        </a:xfrm>
+      </p:grpSpPr>
+      <p:sp>
+        <p:nvSpPr>
+          <p:cNvPr id="2" name="Title 1"/>
+          <p:cNvSpPr>
+            <a:spLocks noGrp="1"/>
+          </p:cNvSpPr>
+          <p:nvPr>
+            <p:ph type="title"/>
+          </p:nvPr>
+        </p:nvSpPr>
+        <p:spPr/>
+        <p:txBody>
+          <a:bodyPr/>
+          <a:lstStyle/>
+          <a:p>
+            <a:r>
+              <a:rPr lang="en-US" dirty="0" err="1" smtClean="0"/>
+              <a:t>Tidefile</a:t>
+            </a:r>
+            <a:endParaRPr lang="en-US" dirty="0"/>
+          </a:p>
+        </p:txBody>
+      </p:sp>
+      <p:sp>
+        <p:nvSpPr>
+          <p:cNvPr id="3" name="Content Placeholder 2"/>
+          <p:cNvSpPr>
+            <a:spLocks noGrp="1"/>
+          </p:cNvSpPr>
+          <p:nvPr>
+            <p:ph idx="1"/>
+          </p:nvPr>
+        </p:nvSpPr>
+        <p:spPr/>
+        <p:txBody>
+          <a:bodyPr/>
+          <a:lstStyle/>
+          <a:p>
+            <a:r>
+              <a:rPr lang="en-US" dirty="0" smtClean="0"/>
+              <a:t>GRID input for QUAL (record of all HYDRO input)</a:t>
+            </a:r>
+          </a:p>
+          <a:p>
+            <a:r>
+              <a:rPr lang="en-US" dirty="0" smtClean="0"/>
+              <a:t>Flow Field</a:t>
+            </a:r>
+          </a:p>
+          <a:p>
+            <a:r>
+              <a:rPr lang="en-US" dirty="0" smtClean="0"/>
+              <a:t>Has own time step, spatial step</a:t>
+            </a:r>
+          </a:p>
+          <a:p>
+            <a:r>
+              <a:rPr lang="en-US" dirty="0" smtClean="0"/>
+              <a:t>IO_FILE section</a:t>
+            </a:r>
+          </a:p>
+          <a:p>
+            <a:r>
+              <a:rPr lang="en-US" dirty="0" smtClean="0"/>
+              <a:t>HDF5 Viewer (they can watch along)</a:t>
+            </a:r>
+          </a:p>
+        </p:txBody>
+      </p:sp>
+      <p:sp>
+        <p:nvSpPr>
+          <p:cNvPr id="4" name="Date Placeholder 3"/>
+          <p:cNvSpPr>
+            <a:spLocks noGrp="1"/>
+          </p:cNvSpPr>
+          <p:nvPr>
+            <p:ph type="dt" sz="half" idx="10"/>
+          </p:nvPr>
+        </p:nvSpPr>
+        <p:spPr/>
+        <p:txBody>
+          <a:bodyPr/>
+          <a:lstStyle/>
+          <a:p>
+            <a:fld id="{AB98F214-5D90-468C-9EE8-E1612B8D2BE2}" type="slidenum">
+              <a:rPr lang="en-US" smtClean="0"/>
+              <a:pPr/>
+              <a:t>14</a:t>
+            </a:fld>
+            <a:endParaRPr lang="en-US"/>
+          </a:p>
+        </p:txBody>
+      </p:sp>
+    </p:spTree>
+  </p:cSld>
+  <p:clrMapOvr>
+    <a:masterClrMapping/>
+  </p:clrMapOvr>
+  <p:transition/>
+</p:sld>
+</file>
+
+<file path=ppt/slides/slide15.xml><?xml version="1.0" encoding="utf-8"?>
+<p:sld xmlns:a="http://schemas.openxmlformats.org/drawingml/2006/main" xmlns:r="http://schemas.openxmlformats.org/officeDocument/2006/relationships" xmlns:p="http://schemas.openxmlformats.org/presentationml/2006/main">
+  <p:cSld>
+    <p:spTree>
+      <p:nvGrpSpPr>
+        <p:cNvPr id="1" name=""/>
+        <p:cNvGrpSpPr/>
+        <p:nvPr/>
+      </p:nvGrpSpPr>
+      <p:grpSpPr>
+        <a:xfrm>
+          <a:off x="0" y="0"/>
+          <a:ext cx="0" cy="0"/>
+          <a:chOff x="0" y="0"/>
+          <a:chExt cx="0" cy="0"/>
+        </a:xfrm>
+      </p:grpSpPr>
+      <p:sp>
+        <p:nvSpPr>
+          <p:cNvPr id="2" name="Title 1"/>
+          <p:cNvSpPr>
+            <a:spLocks noGrp="1"/>
+          </p:cNvSpPr>
+          <p:nvPr>
+            <p:ph type="title"/>
+          </p:nvPr>
+        </p:nvSpPr>
+        <p:spPr/>
+        <p:txBody>
+          <a:bodyPr/>
+          <a:lstStyle/>
+          <a:p>
+            <a:r>
+              <a:rPr lang="en-US" dirty="0" smtClean="0"/>
+              <a:t>Echo Input File</a:t>
+            </a:r>
+            <a:endParaRPr lang="en-US" dirty="0"/>
+          </a:p>
+        </p:txBody>
+      </p:sp>
+      <p:sp>
+        <p:nvSpPr>
+          <p:cNvPr id="3" name="Content Placeholder 2"/>
+          <p:cNvSpPr>
+            <a:spLocks noGrp="1"/>
+          </p:cNvSpPr>
+          <p:nvPr>
+            <p:ph idx="1"/>
+          </p:nvPr>
+        </p:nvSpPr>
+        <p:spPr>
+          <a:xfrm>
+            <a:off x="685799" y="1981200"/>
+            <a:ext cx="8175171" cy="4114800"/>
+          </a:xfrm>
+        </p:spPr>
+        <p:txBody>
+          <a:bodyPr/>
+          <a:lstStyle/>
+          <a:p>
+            <a:r>
+              <a:rPr lang="en-US" dirty="0" smtClean="0"/>
+              <a:t>Archive of run</a:t>
+            </a:r>
+          </a:p>
+          <a:p>
+            <a:r>
+              <a:rPr lang="en-US" dirty="0" smtClean="0"/>
+              <a:t>QA/QC: single-file view of multiple sources</a:t>
+            </a:r>
+          </a:p>
+          <a:p>
+            <a:r>
+              <a:rPr lang="en-US" dirty="0" smtClean="0"/>
+              <a:t>Can be used as an input file</a:t>
+            </a:r>
+          </a:p>
+          <a:p>
+            <a:endParaRPr lang="en-US" dirty="0" smtClean="0"/>
+          </a:p>
+        </p:txBody>
+      </p:sp>
+      <p:sp>
+        <p:nvSpPr>
+          <p:cNvPr id="4" name="Date Placeholder 3"/>
+          <p:cNvSpPr>
+            <a:spLocks noGrp="1"/>
+          </p:cNvSpPr>
+          <p:nvPr>
+            <p:ph type="dt" sz="half" idx="10"/>
+          </p:nvPr>
+        </p:nvSpPr>
+        <p:spPr/>
+        <p:txBody>
+          <a:bodyPr/>
+          <a:lstStyle/>
+          <a:p>
+            <a:fld id="{AB98F214-5D90-468C-9EE8-E1612B8D2BE2}" type="slidenum">
+              <a:rPr lang="en-US" smtClean="0"/>
+              <a:pPr/>
+              <a:t>15</a:t>
+            </a:fld>
+            <a:endParaRPr lang="en-US"/>
+          </a:p>
+        </p:txBody>
+      </p:sp>
+    </p:spTree>
+  </p:cSld>
+  <p:clrMapOvr>
+    <a:masterClrMapping/>
+  </p:clrMapOvr>
+  <p:transition/>
+</p:sld>
+</file>
+
+<file path=ppt/slides/slide16.xml><?xml version="1.0" encoding="utf-8"?>
+<p:sld xmlns:a="http://schemas.openxmlformats.org/drawingml/2006/main" xmlns:r="http://schemas.openxmlformats.org/officeDocument/2006/relationships" xmlns:p="http://schemas.openxmlformats.org/presentationml/2006/main">
+  <p:cSld>
+    <p:spTree>
+      <p:nvGrpSpPr>
+        <p:cNvPr id="1" name=""/>
+        <p:cNvGrpSpPr/>
+        <p:nvPr/>
+      </p:nvGrpSpPr>
+      <p:grpSpPr>
+        <a:xfrm>
+          <a:off x="0" y="0"/>
+          <a:ext cx="0" cy="0"/>
+          <a:chOff x="0" y="0"/>
+          <a:chExt cx="0" cy="0"/>
+        </a:xfrm>
+      </p:grpSpPr>
+      <p:sp>
+        <p:nvSpPr>
+          <p:cNvPr id="2" name="Title 1"/>
+          <p:cNvSpPr>
+            <a:spLocks noGrp="1"/>
+          </p:cNvSpPr>
+          <p:nvPr>
+            <p:ph type="title"/>
+          </p:nvPr>
+        </p:nvSpPr>
+        <p:spPr/>
+        <p:txBody>
+          <a:bodyPr/>
+          <a:lstStyle/>
+          <a:p>
+            <a:r>
+              <a:rPr lang="en-US" dirty="0" smtClean="0"/>
+              <a:t>For v6 Users</a:t>
+            </a:r>
+            <a:endParaRPr lang="en-US" dirty="0"/>
+          </a:p>
+        </p:txBody>
+      </p:sp>
+      <p:sp>
+        <p:nvSpPr>
+          <p:cNvPr id="3" name="Content Placeholder 2"/>
+          <p:cNvSpPr>
+            <a:spLocks noGrp="1"/>
+          </p:cNvSpPr>
+          <p:nvPr>
+            <p:ph idx="1"/>
+          </p:nvPr>
+        </p:nvSpPr>
+        <p:spPr>
+          <a:xfrm>
+            <a:off x="685800" y="1981200"/>
+            <a:ext cx="8153400" cy="4114800"/>
+          </a:xfrm>
+        </p:spPr>
+        <p:txBody>
+          <a:bodyPr/>
+          <a:lstStyle/>
+          <a:p>
+            <a:r>
+              <a:rPr lang="en-US" dirty="0" smtClean="0"/>
+              <a:t>No “priorities” in DSS</a:t>
+            </a:r>
+          </a:p>
+          <a:p>
+            <a:r>
+              <a:rPr lang="en-US" dirty="0" smtClean="0"/>
+              <a:t>Link between Hydro and </a:t>
+            </a:r>
+            <a:r>
+              <a:rPr lang="en-US" dirty="0" err="1" smtClean="0"/>
+              <a:t>Qual</a:t>
+            </a:r>
+            <a:r>
+              <a:rPr lang="en-US" dirty="0" smtClean="0"/>
+              <a:t> different</a:t>
+            </a:r>
+            <a:endParaRPr lang="en-US" dirty="0"/>
+          </a:p>
+        </p:txBody>
+      </p:sp>
+      <p:sp>
+        <p:nvSpPr>
+          <p:cNvPr id="4" name="Date Placeholder 3"/>
+          <p:cNvSpPr>
+            <a:spLocks noGrp="1"/>
+          </p:cNvSpPr>
+          <p:nvPr>
+            <p:ph type="dt" sz="half" idx="10"/>
+          </p:nvPr>
+        </p:nvSpPr>
+        <p:spPr/>
+        <p:txBody>
+          <a:bodyPr/>
+          <a:lstStyle/>
+          <a:p>
+            <a:fld id="{AB98F214-5D90-468C-9EE8-E1612B8D2BE2}" type="slidenum">
+              <a:rPr lang="en-US" smtClean="0"/>
+              <a:pPr/>
+              <a:t>16</a:t>
+            </a:fld>
+            <a:endParaRPr lang="en-US"/>
+          </a:p>
+        </p:txBody>
+      </p:sp>
+    </p:spTree>
+  </p:cSld>
+  <p:clrMapOvr>
+    <a:masterClrMapping/>
+  </p:clrMapOvr>
+  <p:transition/>
+</p:sld>
+</file>
+
+<file path=ppt/slides/slide17.xml><?xml version="1.0" encoding="utf-8"?>
+<p:sld xmlns:a="http://schemas.openxmlformats.org/drawingml/2006/main" xmlns:r="http://schemas.openxmlformats.org/officeDocument/2006/relationships" xmlns:p="http://schemas.openxmlformats.org/presentationml/2006/main">
+  <p:cSld>
+    <p:spTree>
+      <p:nvGrpSpPr>
+        <p:cNvPr id="1" name=""/>
+        <p:cNvGrpSpPr/>
+        <p:nvPr/>
+      </p:nvGrpSpPr>
+      <p:grpSpPr>
+        <a:xfrm>
+          <a:off x="0" y="0"/>
+          <a:ext cx="0" cy="0"/>
+          <a:chOff x="0" y="0"/>
+          <a:chExt cx="0" cy="0"/>
+        </a:xfrm>
+      </p:grpSpPr>
+      <p:sp>
+        <p:nvSpPr>
+          <p:cNvPr id="2" name="Title 1"/>
+          <p:cNvSpPr>
+            <a:spLocks noGrp="1"/>
+          </p:cNvSpPr>
+          <p:nvPr>
+            <p:ph type="title"/>
+          </p:nvPr>
+        </p:nvSpPr>
+        <p:spPr/>
+        <p:txBody>
+          <a:bodyPr/>
+          <a:lstStyle/>
+          <a:p>
+            <a:r>
+              <a:rPr lang="en-US" dirty="0" smtClean="0"/>
+              <a:t>Tutorial 4: Time Series</a:t>
             </a:r>
             <a:endParaRPr lang="en-US" dirty="0"/>
           </a:p>
@@ -3712,6 +5347,16 @@
           <a:bodyPr/>
           <a:lstStyle/>
           <a:p>
+            <a:r>
+              <a:rPr lang="en-US" dirty="0" smtClean="0"/>
+              <a:t>Introduce 4 and a bit of 5</a:t>
+            </a:r>
+          </a:p>
+          <a:p>
+            <a:r>
+              <a:rPr lang="en-US" dirty="0" smtClean="0"/>
+              <a:t>Replaces some constant inputs with a time series that is constant, but also has  a realistic tide</a:t>
+            </a:r>
             <a:endParaRPr lang="en-US" dirty="0"/>
           </a:p>
         </p:txBody>
@@ -3734,7 +5379,7 @@
             <a:fld id="{AB98F214-5D90-468C-9EE8-E1612B8D2BE2}" type="slidenum">
               <a:rPr lang="en-US" smtClean="0"/>
               <a:pPr/>
-              <a:t>10</a:t>
+              <a:t>17</a:t>
             </a:fld>
             <a:endParaRPr lang="en-US"/>
           </a:p>
@@ -3846,7 +5491,12 @@
               <a:rPr lang="en-US" dirty="0" smtClean="0"/>
               <a:t>Boundary Conditions for HYDRO/QUAL</a:t>
             </a:r>
-            <a:endParaRPr lang="en-US" dirty="0" smtClean="0"/>
+          </a:p>
+          <a:p>
+            <a:r>
+              <a:rPr lang="en-US" dirty="0" smtClean="0"/>
+              <a:t>Other TS (gates, sources)</a:t>
+            </a:r>
           </a:p>
           <a:p>
             <a:r>
@@ -3859,21 +5509,18 @@
               <a:rPr lang="en-US" dirty="0" smtClean="0"/>
               <a:t>Time series formats: text, HEC-DSS</a:t>
             </a:r>
-            <a:endParaRPr lang="en-US" dirty="0" smtClean="0"/>
-          </a:p>
-          <a:p>
-            <a:r>
-              <a:rPr lang="en-US" dirty="0" smtClean="0"/>
-              <a:t>Output</a:t>
-            </a:r>
-            <a:endParaRPr lang="en-US" dirty="0" smtClean="0"/>
+          </a:p>
+          <a:p>
+            <a:r>
+              <a:rPr lang="en-US" dirty="0" smtClean="0"/>
+              <a:t>Time Series Output</a:t>
+            </a:r>
           </a:p>
           <a:p>
             <a:r>
               <a:rPr lang="en-US" dirty="0" smtClean="0"/>
               <a:t>Initial Conditions (default, restart)</a:t>
             </a:r>
-            <a:endParaRPr lang="en-US" dirty="0" smtClean="0"/>
           </a:p>
           <a:p>
             <a:r>
@@ -3991,7 +5638,7 @@
           <a:p>
             <a:r>
               <a:rPr lang="en-US" dirty="0" smtClean="0"/>
-              <a:t>Boundary Conditions</a:t>
+              <a:t>Basic Input</a:t>
             </a:r>
             <a:endParaRPr lang="en-US" dirty="0"/>
           </a:p>
@@ -4009,8 +5656,8 @@
         </p:nvSpPr>
         <p:spPr>
           <a:xfrm>
-            <a:off x="685800" y="1596325"/>
-            <a:ext cx="7772400" cy="4881967"/>
+            <a:off x="685800" y="1458686"/>
+            <a:ext cx="7772400" cy="4637314"/>
           </a:xfrm>
         </p:spPr>
         <p:txBody>
@@ -4019,28 +5666,37 @@
           <a:p>
             <a:r>
               <a:rPr lang="en-US" dirty="0" smtClean="0"/>
-              <a:t>What required</a:t>
-            </a:r>
-          </a:p>
-          <a:p>
-            <a:r>
-              <a:rPr lang="en-US" dirty="0" smtClean="0"/>
-              <a:t>Other TS input (gates)</a:t>
-            </a:r>
-          </a:p>
-          <a:p>
-            <a:r>
-              <a:rPr lang="en-US" dirty="0" smtClean="0"/>
-              <a:t>Linking </a:t>
-            </a:r>
-            <a:r>
-              <a:rPr lang="en-US" dirty="0" err="1" smtClean="0"/>
-              <a:t>qual</a:t>
-            </a:r>
-            <a:r>
-              <a:rPr lang="en-US" dirty="0" smtClean="0"/>
-              <a:t> to hydro</a:t>
-            </a:r>
+              <a:t>Configuration</a:t>
+            </a:r>
+          </a:p>
+          <a:p>
+            <a:r>
+              <a:rPr lang="en-US" dirty="0" smtClean="0"/>
+              <a:t>Grid</a:t>
+            </a:r>
+          </a:p>
+          <a:p>
+            <a:r>
+              <a:rPr lang="en-US" dirty="0" smtClean="0"/>
+              <a:t>Boundary Conditions</a:t>
+            </a:r>
+          </a:p>
+          <a:p>
+            <a:r>
+              <a:rPr lang="en-US" dirty="0" smtClean="0"/>
+              <a:t>Initial Conditions</a:t>
+            </a:r>
+          </a:p>
+          <a:p>
+            <a:r>
+              <a:rPr lang="en-US" dirty="0" smtClean="0"/>
+              <a:t>Operation</a:t>
+            </a:r>
+          </a:p>
+          <a:p>
+            <a:pPr>
+              <a:buNone/>
+            </a:pPr>
             <a:endParaRPr lang="en-US" dirty="0"/>
           </a:p>
         </p:txBody>
@@ -4075,13 +5731,6 @@
     <a:masterClrMapping/>
   </p:clrMapOvr>
   <p:transition/>
-  <p:timing>
-    <p:tnLst>
-      <p:par>
-        <p:cTn id="1" dur="indefinite" restart="never" nodeType="tmRoot"/>
-      </p:par>
-    </p:tnLst>
-  </p:timing>
 </p:sld>
 </file>
 
@@ -4117,9 +5766,10 @@
           <a:bodyPr/>
           <a:lstStyle/>
           <a:p>
-            <a:r>
-              <a:rPr lang="en-US" dirty="0" smtClean="0"/>
-              <a:t>Time Series Control</a:t>
+            <a:pPr algn="l"/>
+            <a:r>
+              <a:rPr lang="en-US" dirty="0" smtClean="0"/>
+              <a:t>Input</a:t>
             </a:r>
             <a:endParaRPr lang="en-US" dirty="0"/>
           </a:p>
@@ -4137,8 +5787,8 @@
         </p:nvSpPr>
         <p:spPr>
           <a:xfrm>
-            <a:off x="348712" y="1593742"/>
-            <a:ext cx="8132736" cy="4512589"/>
+            <a:off x="685799" y="1458686"/>
+            <a:ext cx="4909457" cy="4637314"/>
           </a:xfrm>
         </p:spPr>
         <p:txBody>
@@ -4146,21 +5796,36 @@
           <a:lstStyle/>
           <a:p>
             <a:r>
-              <a:rPr lang="en-US" dirty="0" smtClean="0"/>
-              <a:t>Default value -&gt; time series -&gt; </a:t>
-            </a:r>
-            <a:r>
-              <a:rPr lang="en-US" dirty="0" err="1" smtClean="0"/>
-              <a:t>oprule</a:t>
-            </a:r>
-            <a:endParaRPr lang="en-US" dirty="0" smtClean="0"/>
-          </a:p>
-          <a:p>
-            <a:r>
-              <a:rPr lang="en-US" dirty="0" smtClean="0"/>
-              <a:t>Graphic with example (probably gate op)</a:t>
-            </a:r>
-            <a:endParaRPr lang="en-US" dirty="0" smtClean="0"/>
+              <a:rPr lang="en-US" sz="2000" dirty="0" smtClean="0"/>
+              <a:t>Configuration</a:t>
+            </a:r>
+          </a:p>
+          <a:p>
+            <a:pPr lvl="1"/>
+            <a:r>
+              <a:rPr lang="en-US" sz="1800" dirty="0" smtClean="0"/>
+              <a:t>ENVVAR</a:t>
+            </a:r>
+          </a:p>
+          <a:p>
+            <a:pPr lvl="1"/>
+            <a:r>
+              <a:rPr lang="en-US" sz="1800" dirty="0" smtClean="0"/>
+              <a:t>SCALAR</a:t>
+            </a:r>
+          </a:p>
+          <a:p>
+            <a:pPr lvl="1"/>
+            <a:r>
+              <a:rPr lang="en-US" sz="1800" dirty="0" smtClean="0"/>
+              <a:t>IO_FILE</a:t>
+            </a:r>
+          </a:p>
+          <a:p>
+            <a:pPr>
+              <a:buNone/>
+            </a:pPr>
+            <a:endParaRPr lang="en-US" dirty="0"/>
           </a:p>
         </p:txBody>
       </p:sp>
@@ -4188,6 +5853,40 @@
           </a:p>
         </p:txBody>
       </p:sp>
+      <p:pic>
+        <p:nvPicPr>
+          <p:cNvPr id="1028" name="Picture 4">
+            <a:hlinkClick r:id="rId3" action="ppaction://hlinkfile"/>
+          </p:cNvPr>
+          <p:cNvPicPr>
+            <a:picLocks noChangeAspect="1" noChangeArrowheads="1"/>
+          </p:cNvPicPr>
+          <p:nvPr/>
+        </p:nvPicPr>
+        <p:blipFill>
+          <a:blip r:embed="rId4" cstate="print"/>
+          <a:srcRect/>
+          <a:stretch>
+            <a:fillRect/>
+          </a:stretch>
+        </p:blipFill>
+        <p:spPr bwMode="auto">
+          <a:xfrm>
+            <a:off x="3311299" y="272143"/>
+            <a:ext cx="4948312" cy="6400800"/>
+          </a:xfrm>
+          <a:prstGeom prst="rect">
+            <a:avLst/>
+          </a:prstGeom>
+          <a:noFill/>
+          <a:ln w="9525">
+            <a:noFill/>
+            <a:miter lim="800000"/>
+            <a:headEnd/>
+            <a:tailEnd/>
+          </a:ln>
+        </p:spPr>
+      </p:pic>
     </p:spTree>
   </p:cSld>
   <p:clrMapOvr>
@@ -4238,7 +5937,7 @@
           <a:p>
             <a:r>
               <a:rPr lang="en-US" dirty="0" smtClean="0"/>
-              <a:t>Initial Condition Input</a:t>
+              <a:t>Basic Input</a:t>
             </a:r>
             <a:endParaRPr lang="en-US" dirty="0"/>
           </a:p>
@@ -4254,53 +5953,54 @@
             <p:ph idx="1"/>
           </p:nvPr>
         </p:nvSpPr>
-        <p:spPr/>
-        <p:txBody>
-          <a:bodyPr/>
-          <a:lstStyle/>
-          <a:p>
-            <a:r>
-              <a:rPr lang="en-US" dirty="0" smtClean="0"/>
-              <a:t>HYDRO Default: </a:t>
+        <p:spPr>
+          <a:xfrm>
+            <a:off x="685800" y="1458686"/>
+            <a:ext cx="7772400" cy="4637314"/>
+          </a:xfrm>
+        </p:spPr>
+        <p:txBody>
+          <a:bodyPr/>
+          <a:lstStyle/>
+          <a:p>
+            <a:r>
+              <a:rPr lang="en-US" dirty="0" smtClean="0"/>
+              <a:t>Grid</a:t>
             </a:r>
           </a:p>
           <a:p>
             <a:pPr lvl="1"/>
             <a:r>
               <a:rPr lang="en-US" dirty="0" smtClean="0"/>
-              <a:t>CHANNEL_IC</a:t>
+              <a:t>Channel</a:t>
             </a:r>
           </a:p>
           <a:p>
             <a:pPr lvl="1"/>
             <a:r>
               <a:rPr lang="en-US" dirty="0" smtClean="0"/>
-              <a:t>RESERVOIR_IC</a:t>
-            </a:r>
-          </a:p>
-          <a:p>
-            <a:r>
-              <a:rPr lang="en-US" dirty="0" smtClean="0"/>
-              <a:t>QUAL Default</a:t>
+              <a:t>Reservoir</a:t>
             </a:r>
           </a:p>
           <a:p>
             <a:pPr lvl="1"/>
             <a:r>
               <a:rPr lang="en-US" dirty="0" smtClean="0"/>
-              <a:t>Scalar </a:t>
-            </a:r>
-            <a:r>
-              <a:rPr lang="en-US" dirty="0" err="1" smtClean="0"/>
-              <a:t>init_conc</a:t>
-            </a:r>
+              <a:t>Gate</a:t>
+            </a:r>
+          </a:p>
+          <a:p>
+            <a:pPr lvl="1"/>
+            <a:r>
+              <a:rPr lang="en-US" dirty="0" smtClean="0"/>
+              <a:t>Transfer</a:t>
+            </a:r>
+          </a:p>
+          <a:p>
+            <a:pPr lvl="1">
+              <a:buNone/>
+            </a:pPr>
             <a:endParaRPr lang="en-US" dirty="0" smtClean="0"/>
-          </a:p>
-          <a:p>
-            <a:r>
-              <a:rPr lang="en-US" dirty="0" smtClean="0"/>
-              <a:t>Restart files replace the default</a:t>
-            </a:r>
           </a:p>
         </p:txBody>
       </p:sp>
@@ -4328,12 +6028,53 @@
           </a:p>
         </p:txBody>
       </p:sp>
+      <p:pic>
+        <p:nvPicPr>
+          <p:cNvPr id="2050" name="Picture 2">
+            <a:hlinkClick r:id="rId3" action="ppaction://hlinkfile"/>
+          </p:cNvPr>
+          <p:cNvPicPr>
+            <a:picLocks noChangeAspect="1" noChangeArrowheads="1"/>
+          </p:cNvPicPr>
+          <p:nvPr/>
+        </p:nvPicPr>
+        <p:blipFill>
+          <a:blip r:embed="rId4" cstate="print"/>
+          <a:srcRect/>
+          <a:stretch>
+            <a:fillRect/>
+          </a:stretch>
+        </p:blipFill>
+        <p:spPr bwMode="auto">
+          <a:xfrm>
+            <a:off x="3354842" y="1671638"/>
+            <a:ext cx="4371975" cy="2905125"/>
+          </a:xfrm>
+          <a:prstGeom prst="rect">
+            <a:avLst/>
+          </a:prstGeom>
+          <a:noFill/>
+          <a:ln w="9525">
+            <a:noFill/>
+            <a:miter lim="800000"/>
+            <a:headEnd/>
+            <a:tailEnd/>
+          </a:ln>
+        </p:spPr>
+      </p:pic>
     </p:spTree>
   </p:cSld>
   <p:clrMapOvr>
     <a:masterClrMapping/>
   </p:clrMapOvr>
   <p:transition/>
+  <p:timing>
+    <p:tnLst>
+      <p:par>
+        <p:cTn id="1" dur="indefinite" restart="never" nodeType="tmRoot"/>
+      </p:par>
+    </p:tnLst>
+  </p:timing>
 </p:sld>
 </file>
 
@@ -4371,7 +6112,7 @@
           <a:p>
             <a:r>
               <a:rPr lang="en-US" dirty="0" smtClean="0"/>
-              <a:t>Initial Conditions	</a:t>
+              <a:t>Basic Input</a:t>
             </a:r>
             <a:endParaRPr lang="en-US" dirty="0"/>
           </a:p>
@@ -4387,34 +6128,39 @@
             <p:ph idx="1"/>
           </p:nvPr>
         </p:nvSpPr>
-        <p:spPr/>
-        <p:txBody>
-          <a:bodyPr/>
-          <a:lstStyle/>
-          <a:p>
-            <a:r>
-              <a:rPr lang="en-US" dirty="0" smtClean="0"/>
-              <a:t>HYDRO and QUAL require initial…</a:t>
-            </a:r>
-          </a:p>
-          <a:p>
-            <a:r>
-              <a:rPr lang="en-US" dirty="0" smtClean="0"/>
-              <a:t>System Memory</a:t>
-            </a:r>
-          </a:p>
-          <a:p>
-            <a:r>
-              <a:rPr lang="en-US" dirty="0" smtClean="0"/>
-              <a:t>Practices (cold start, warm)</a:t>
-            </a:r>
-          </a:p>
-          <a:p>
+        <p:spPr>
+          <a:xfrm>
+            <a:off x="685800" y="1458686"/>
+            <a:ext cx="7772400" cy="4637314"/>
+          </a:xfrm>
+        </p:spPr>
+        <p:txBody>
+          <a:bodyPr/>
+          <a:lstStyle/>
+          <a:p>
+            <a:r>
+              <a:rPr lang="en-US" dirty="0" smtClean="0"/>
+              <a:t>Boundary Conditions</a:t>
+            </a:r>
+          </a:p>
+          <a:p>
+            <a:pPr lvl="1"/>
+            <a:r>
+              <a:rPr lang="en-US" dirty="0" smtClean="0"/>
+              <a:t>Hydro is stage or flow</a:t>
+            </a:r>
+          </a:p>
+          <a:p>
+            <a:pPr lvl="2"/>
+            <a:r>
+              <a:rPr lang="en-US" dirty="0" smtClean="0"/>
+              <a:t>Default is </a:t>
+            </a:r>
+            <a:r>
+              <a:rPr lang="en-US" dirty="0" smtClean="0"/>
+              <a:t>no-flow</a:t>
+            </a:r>
             <a:endParaRPr lang="en-US" dirty="0" smtClean="0"/>
-          </a:p>
-          <a:p>
-            <a:pPr algn="ctr"/>
-            <a:endParaRPr lang="en-US" dirty="0"/>
           </a:p>
         </p:txBody>
       </p:sp>
@@ -4442,12 +6188,53 @@
           </a:p>
         </p:txBody>
       </p:sp>
+      <p:pic>
+        <p:nvPicPr>
+          <p:cNvPr id="1026" name="Picture 2">
+            <a:hlinkClick r:id="rId3" action="ppaction://hlinkfile"/>
+          </p:cNvPr>
+          <p:cNvPicPr>
+            <a:picLocks noChangeAspect="1" noChangeArrowheads="1"/>
+          </p:cNvPicPr>
+          <p:nvPr/>
+        </p:nvPicPr>
+        <p:blipFill>
+          <a:blip r:embed="rId4" cstate="print"/>
+          <a:srcRect/>
+          <a:stretch>
+            <a:fillRect/>
+          </a:stretch>
+        </p:blipFill>
+        <p:spPr bwMode="auto">
+          <a:xfrm>
+            <a:off x="2850349" y="2945415"/>
+            <a:ext cx="4962525" cy="3448050"/>
+          </a:xfrm>
+          <a:prstGeom prst="rect">
+            <a:avLst/>
+          </a:prstGeom>
+          <a:noFill/>
+          <a:ln w="9525">
+            <a:noFill/>
+            <a:miter lim="800000"/>
+            <a:headEnd/>
+            <a:tailEnd/>
+          </a:ln>
+        </p:spPr>
+      </p:pic>
     </p:spTree>
   </p:cSld>
   <p:clrMapOvr>
     <a:masterClrMapping/>
   </p:clrMapOvr>
   <p:transition/>
+  <p:timing>
+    <p:tnLst>
+      <p:par>
+        <p:cTn id="1" dur="indefinite" restart="never" nodeType="tmRoot"/>
+      </p:par>
+    </p:tnLst>
+  </p:timing>
 </p:sld>
 </file>
 
@@ -4485,7 +6272,7 @@
           <a:p>
             <a:r>
               <a:rPr lang="en-US" dirty="0" smtClean="0"/>
-              <a:t>For v6 Users</a:t>
+              <a:t>Basic Input</a:t>
             </a:r>
             <a:endParaRPr lang="en-US" dirty="0"/>
           </a:p>
@@ -4503,8 +6290,8 @@
         </p:nvSpPr>
         <p:spPr>
           <a:xfrm>
-            <a:off x="685800" y="1981200"/>
-            <a:ext cx="8153400" cy="4114800"/>
+            <a:off x="685800" y="1458686"/>
+            <a:ext cx="7772400" cy="4637314"/>
           </a:xfrm>
         </p:spPr>
         <p:txBody>
@@ -4513,23 +6300,37 @@
           <a:p>
             <a:r>
               <a:rPr lang="en-US" dirty="0" smtClean="0"/>
-              <a:t>No “priorities” in DSS</a:t>
-            </a:r>
-          </a:p>
-          <a:p>
-            <a:r>
-              <a:rPr lang="en-US" dirty="0" smtClean="0"/>
-              <a:t>Link between Hydro and </a:t>
-            </a:r>
+              <a:t>Boundary </a:t>
+            </a:r>
+            <a:r>
+              <a:rPr lang="en-US" dirty="0" smtClean="0"/>
+              <a:t>Conditions (Continue)</a:t>
+            </a:r>
+            <a:endParaRPr lang="en-US" dirty="0" smtClean="0"/>
+          </a:p>
+          <a:p>
+            <a:pPr lvl="1"/>
             <a:r>
               <a:rPr lang="en-US" dirty="0" err="1" smtClean="0"/>
               <a:t>Qual</a:t>
             </a:r>
             <a:r>
               <a:rPr lang="en-US" dirty="0" smtClean="0"/>
-              <a:t> different</a:t>
-            </a:r>
-            <a:endParaRPr lang="en-US" dirty="0"/>
+              <a:t> concentration for every inflow</a:t>
+            </a:r>
+          </a:p>
+          <a:p>
+            <a:pPr lvl="2"/>
+            <a:r>
+              <a:rPr lang="en-US" dirty="0" smtClean="0"/>
+              <a:t>Default zero with warning</a:t>
+            </a:r>
+          </a:p>
+          <a:p>
+            <a:pPr lvl="1">
+              <a:buNone/>
+            </a:pPr>
+            <a:endParaRPr lang="en-US" dirty="0" smtClean="0"/>
           </a:p>
         </p:txBody>
       </p:sp>
@@ -4563,6 +6364,13 @@
     <a:masterClrMapping/>
   </p:clrMapOvr>
   <p:transition/>
+  <p:timing>
+    <p:tnLst>
+      <p:par>
+        <p:cTn id="1" dur="indefinite" restart="never" nodeType="tmRoot"/>
+      </p:par>
+    </p:tnLst>
+  </p:timing>
 </p:sld>
 </file>
 
@@ -4599,8 +6407,8 @@
           <a:lstStyle/>
           <a:p>
             <a:r>
-              <a:rPr lang="en-US" dirty="0" err="1" smtClean="0"/>
-              <a:t>Tidefile</a:t>
+              <a:rPr lang="en-US" dirty="0" smtClean="0"/>
+              <a:t>Input</a:t>
             </a:r>
             <a:endParaRPr lang="en-US" dirty="0"/>
           </a:p>
@@ -4616,39 +6424,59 @@
             <p:ph idx="1"/>
           </p:nvPr>
         </p:nvSpPr>
-        <p:spPr/>
-        <p:txBody>
-          <a:bodyPr/>
-          <a:lstStyle/>
-          <a:p>
-            <a:r>
-              <a:rPr lang="en-US" dirty="0" smtClean="0"/>
-              <a:t>GRID input for QUAL</a:t>
-            </a:r>
-          </a:p>
-          <a:p>
-            <a:r>
-              <a:rPr lang="en-US" dirty="0" smtClean="0"/>
-              <a:t>Transfers Flow Field</a:t>
-            </a:r>
-          </a:p>
-          <a:p>
-            <a:r>
-              <a:rPr lang="en-US" dirty="0" smtClean="0"/>
-              <a:t>Has own time step, spatial step</a:t>
-            </a:r>
-          </a:p>
-          <a:p>
-            <a:r>
-              <a:rPr lang="en-US" dirty="0" smtClean="0"/>
-              <a:t>IO_FILE section</a:t>
-            </a:r>
-          </a:p>
-          <a:p>
-            <a:r>
-              <a:rPr lang="en-US" dirty="0" smtClean="0"/>
-              <a:t>HDF5 Viewer (they can watch along)</a:t>
-            </a:r>
+        <p:spPr>
+          <a:xfrm>
+            <a:off x="685800" y="1458686"/>
+            <a:ext cx="7772400" cy="4637314"/>
+          </a:xfrm>
+        </p:spPr>
+        <p:txBody>
+          <a:bodyPr/>
+          <a:lstStyle/>
+          <a:p>
+            <a:r>
+              <a:rPr lang="en-US" dirty="0" smtClean="0"/>
+              <a:t>Configuration</a:t>
+            </a:r>
+          </a:p>
+          <a:p>
+            <a:pPr lvl="1"/>
+            <a:r>
+              <a:rPr lang="en-US" dirty="0" smtClean="0"/>
+              <a:t>ENVVAR</a:t>
+            </a:r>
+          </a:p>
+          <a:p>
+            <a:pPr lvl="1"/>
+            <a:r>
+              <a:rPr lang="en-US" dirty="0" smtClean="0"/>
+              <a:t>SCALAR</a:t>
+            </a:r>
+          </a:p>
+          <a:p>
+            <a:r>
+              <a:rPr lang="en-US" dirty="0" smtClean="0"/>
+              <a:t>Grid</a:t>
+            </a:r>
+          </a:p>
+          <a:p>
+            <a:pPr lvl="1"/>
+            <a:endParaRPr lang="en-US" dirty="0" smtClean="0"/>
+          </a:p>
+          <a:p>
+            <a:r>
+              <a:rPr lang="en-US" dirty="0" smtClean="0"/>
+              <a:t>Boundary Conditions (Upstream, Downstream, flow, stage, source/sink)</a:t>
+            </a:r>
+          </a:p>
+          <a:p>
+            <a:r>
+              <a:rPr lang="en-US" dirty="0" smtClean="0"/>
+              <a:t>Initial Conditions</a:t>
+            </a:r>
+          </a:p>
+          <a:p>
+            <a:endParaRPr lang="en-US" dirty="0"/>
           </a:p>
         </p:txBody>
       </p:sp>
@@ -4682,6 +6510,13 @@
     <a:masterClrMapping/>
   </p:clrMapOvr>
   <p:transition/>
+  <p:timing>
+    <p:tnLst>
+      <p:par>
+        <p:cTn id="1" dur="indefinite" restart="never" nodeType="tmRoot"/>
+      </p:par>
+    </p:tnLst>
+  </p:timing>
 </p:sld>
 </file>
 
@@ -4719,7 +6554,7 @@
           <a:p>
             <a:r>
               <a:rPr lang="en-US" dirty="0" smtClean="0"/>
-              <a:t>Echo Input File</a:t>
+              <a:t>Boundary Conditions</a:t>
             </a:r>
             <a:endParaRPr lang="en-US" dirty="0"/>
           </a:p>
@@ -4735,30 +6570,80 @@
             <p:ph idx="1"/>
           </p:nvPr>
         </p:nvSpPr>
-        <p:spPr/>
-        <p:txBody>
-          <a:bodyPr/>
-          <a:lstStyle/>
-          <a:p>
-            <a:r>
-              <a:rPr lang="en-US" dirty="0" smtClean="0"/>
-              <a:t>Archive of run</a:t>
-            </a:r>
-          </a:p>
-          <a:p>
-            <a:r>
-              <a:rPr lang="en-US" dirty="0" smtClean="0"/>
-              <a:t>QA/QC: single-file view of multiple sources</a:t>
-            </a:r>
-          </a:p>
-          <a:p>
-            <a:r>
-              <a:rPr lang="en-US" dirty="0" smtClean="0"/>
-              <a:t>Can be used as an input file</a:t>
-            </a:r>
-          </a:p>
-          <a:p>
-            <a:endParaRPr lang="en-US" dirty="0" smtClean="0"/>
+        <p:spPr>
+          <a:xfrm>
+            <a:off x="685800" y="1596325"/>
+            <a:ext cx="7772400" cy="4881967"/>
+          </a:xfrm>
+        </p:spPr>
+        <p:txBody>
+          <a:bodyPr/>
+          <a:lstStyle/>
+          <a:p>
+            <a:r>
+              <a:rPr lang="en-US" dirty="0" smtClean="0"/>
+              <a:t>What required</a:t>
+            </a:r>
+          </a:p>
+          <a:p>
+            <a:pPr lvl="1"/>
+            <a:r>
+              <a:rPr lang="en-US" dirty="0" smtClean="0"/>
+              <a:t>Hydro is stage or flow</a:t>
+            </a:r>
+          </a:p>
+          <a:p>
+            <a:pPr lvl="2"/>
+            <a:r>
+              <a:rPr lang="en-US" dirty="0" smtClean="0"/>
+              <a:t>Default is no-flow</a:t>
+            </a:r>
+          </a:p>
+          <a:p>
+            <a:pPr lvl="1"/>
+            <a:r>
+              <a:rPr lang="en-US" dirty="0" err="1" smtClean="0"/>
+              <a:t>Qual</a:t>
+            </a:r>
+            <a:r>
+              <a:rPr lang="en-US" dirty="0" smtClean="0"/>
+              <a:t> concentration for every inflow</a:t>
+            </a:r>
+          </a:p>
+          <a:p>
+            <a:pPr lvl="2"/>
+            <a:r>
+              <a:rPr lang="en-US" dirty="0" smtClean="0"/>
+              <a:t>Default zero with warning</a:t>
+            </a:r>
+          </a:p>
+          <a:p>
+            <a:pPr lvl="2"/>
+            <a:r>
+              <a:rPr lang="en-US" dirty="0" smtClean="0"/>
+              <a:t>Tidal boundary may not always be used</a:t>
+            </a:r>
+          </a:p>
+          <a:p>
+            <a:r>
+              <a:rPr lang="en-US" dirty="0" smtClean="0"/>
+              <a:t>Other TS input (gates)</a:t>
+            </a:r>
+          </a:p>
+          <a:p>
+            <a:r>
+              <a:rPr lang="en-US" dirty="0" smtClean="0"/>
+              <a:t>Linking </a:t>
+            </a:r>
+            <a:r>
+              <a:rPr lang="en-US" dirty="0" err="1" smtClean="0"/>
+              <a:t>qual</a:t>
+            </a:r>
+            <a:r>
+              <a:rPr lang="en-US" dirty="0" smtClean="0"/>
+              <a:t> to hydro (name of input)</a:t>
+            </a:r>
+            <a:endParaRPr lang="en-US" dirty="0"/>
           </a:p>
         </p:txBody>
       </p:sp>
@@ -4792,6 +6677,13 @@
     <a:masterClrMapping/>
   </p:clrMapOvr>
   <p:transition/>
+  <p:timing>
+    <p:tnLst>
+      <p:par>
+        <p:cTn id="1" dur="indefinite" restart="never" nodeType="tmRoot"/>
+      </p:par>
+    </p:tnLst>
+  </p:timing>
 </p:sld>
 </file>
 

</xml_diff>